<commit_message>
Updated presentation front matter and syntax slides.
</commit_message>
<xml_diff>
--- a/Presentations/20161207-Coronado-Meeting/PSSM-revised-submission.pptx
+++ b/Presentations/20161207-Coronado-Meeting/PSSM-revised-submission.pptx
@@ -264,7 +264,6 @@
           </a:p>
         </c:rich>
       </c:tx>
-      <c:layout/>
       <c:overlay val="0"/>
       <c:spPr>
         <a:noFill/>
@@ -370,7 +369,6 @@
             <c:showLeaderLines val="0"/>
             <c:extLst>
               <c:ext xmlns:c15="http://schemas.microsoft.com/office/drawing/2012/chart" uri="{CE6537A1-D6FC-4f65-9D91-7224C49458BB}">
-                <c15:layout/>
                 <c15:showLeaderLines val="1"/>
                 <c15:leaderLines>
                   <c:spPr>
@@ -520,7 +518,6 @@
             <c:showLeaderLines val="0"/>
             <c:extLst>
               <c:ext xmlns:c15="http://schemas.microsoft.com/office/drawing/2012/chart" uri="{CE6537A1-D6FC-4f65-9D91-7224C49458BB}">
-                <c15:layout/>
                 <c15:showLeaderLines val="1"/>
                 <c15:leaderLines>
                   <c:spPr>
@@ -670,7 +667,6 @@
             <c:showLeaderLines val="0"/>
             <c:extLst>
               <c:ext xmlns:c15="http://schemas.microsoft.com/office/drawing/2012/chart" uri="{CE6537A1-D6FC-4f65-9D91-7224C49458BB}">
-                <c15:layout/>
                 <c15:showLeaderLines val="1"/>
                 <c15:leaderLines>
                   <c:spPr>
@@ -759,11 +755,11 @@
           <c:showBubbleSize val="0"/>
         </c:dLbls>
         <c:smooth val="0"/>
-        <c:axId val="-1222206048"/>
-        <c:axId val="-1222203216"/>
+        <c:axId val="-1218105008"/>
+        <c:axId val="-1218102176"/>
       </c:lineChart>
       <c:catAx>
-        <c:axId val="-1222206048"/>
+        <c:axId val="-1218105008"/>
         <c:scaling>
           <c:orientation val="minMax"/>
         </c:scaling>
@@ -824,7 +820,7 @@
             <a:endParaRPr lang="en-US"/>
           </a:p>
         </c:txPr>
-        <c:crossAx val="-1222203216"/>
+        <c:crossAx val="-1218102176"/>
         <c:crosses val="autoZero"/>
         <c:auto val="1"/>
         <c:lblAlgn val="ctr"/>
@@ -832,7 +828,7 @@
         <c:noMultiLvlLbl val="0"/>
       </c:catAx>
       <c:valAx>
-        <c:axId val="-1222203216"/>
+        <c:axId val="-1218102176"/>
         <c:scaling>
           <c:orientation val="minMax"/>
         </c:scaling>
@@ -893,7 +889,7 @@
             <a:endParaRPr lang="en-US"/>
           </a:p>
         </c:txPr>
-        <c:crossAx val="-1222206048"/>
+        <c:crossAx val="-1218105008"/>
         <c:crosses val="autoZero"/>
         <c:crossBetween val="between"/>
       </c:valAx>
@@ -907,7 +903,6 @@
     </c:plotArea>
     <c:legend>
       <c:legendPos val="t"/>
-      <c:layout/>
       <c:overlay val="0"/>
       <c:spPr>
         <a:noFill/>
@@ -10025,6 +10020,13 @@
   <p:clrMapOvr>
     <a:masterClrMapping/>
   </p:clrMapOvr>
+  <p:timing>
+    <p:tnLst>
+      <p:par>
+        <p:cTn id="1" dur="indefinite" restart="never" nodeType="tmRoot"/>
+      </p:par>
+    </p:tnLst>
+  </p:timing>
 </p:sld>
 </file>
 
@@ -12723,8 +12725,8 @@
         </p:blipFill>
         <p:spPr>
           <a:xfrm>
-            <a:off x="1043608" y="969601"/>
-            <a:ext cx="7122319" cy="5610701"/>
+            <a:off x="1105272" y="969601"/>
+            <a:ext cx="6222323" cy="5610701"/>
           </a:xfrm>
           <a:prstGeom prst="rect">
             <a:avLst/>
@@ -12762,7 +12764,7 @@
         </p:nvSpPr>
         <p:spPr>
           <a:xfrm>
-            <a:off x="6228184" y="4653136"/>
+            <a:off x="6505872" y="4653136"/>
             <a:ext cx="2458616" cy="1584176"/>
           </a:xfrm>
           <a:prstGeom prst="rect">
@@ -12962,8 +12964,8 @@
         </p:blipFill>
         <p:spPr>
           <a:xfrm>
-            <a:off x="467544" y="1076325"/>
-            <a:ext cx="7372350" cy="5400675"/>
+            <a:off x="467544" y="1088379"/>
+            <a:ext cx="7372350" cy="5376567"/>
           </a:xfrm>
           <a:prstGeom prst="rect">
             <a:avLst/>
@@ -13184,6 +13186,13 @@
   <p:clrMapOvr>
     <a:masterClrMapping/>
   </p:clrMapOvr>
+  <p:timing>
+    <p:tnLst>
+      <p:par>
+        <p:cTn id="1" dur="indefinite" restart="never" nodeType="tmRoot"/>
+      </p:par>
+    </p:tnLst>
+  </p:timing>
 </p:sld>
 </file>
 
@@ -13226,8 +13235,8 @@
         </p:blipFill>
         <p:spPr>
           <a:xfrm>
-            <a:off x="1832423" y="915700"/>
-            <a:ext cx="5762917" cy="5897676"/>
+            <a:off x="1835696" y="915700"/>
+            <a:ext cx="5709796" cy="5897676"/>
           </a:xfrm>
           <a:prstGeom prst="rect">
             <a:avLst/>
@@ -13313,7 +13322,7 @@
         <p:spPr>
           <a:xfrm>
             <a:off x="1786975" y="946208"/>
-            <a:ext cx="1416873" cy="3994960"/>
+            <a:ext cx="1416873" cy="4066968"/>
           </a:xfrm>
           <a:prstGeom prst="rect">
             <a:avLst/>
@@ -13951,6 +13960,13 @@
   <p:clrMapOvr>
     <a:masterClrMapping/>
   </p:clrMapOvr>
+  <p:timing>
+    <p:tnLst>
+      <p:par>
+        <p:cTn id="1" dur="indefinite" restart="never" nodeType="tmRoot"/>
+      </p:par>
+    </p:tnLst>
+  </p:timing>
 </p:sld>
 </file>
 
@@ -14070,6 +14086,13 @@
   <p:clrMapOvr>
     <a:masterClrMapping/>
   </p:clrMapOvr>
+  <p:timing>
+    <p:tnLst>
+      <p:par>
+        <p:cTn id="1" dur="indefinite" restart="never" nodeType="tmRoot"/>
+      </p:par>
+    </p:tnLst>
+  </p:timing>
 </p:sld>
 </file>
 
@@ -14543,6 +14566,13 @@
   <p:clrMapOvr>
     <a:masterClrMapping/>
   </p:clrMapOvr>
+  <p:timing>
+    <p:tnLst>
+      <p:par>
+        <p:cTn id="1" dur="indefinite" restart="never" nodeType="tmRoot"/>
+      </p:par>
+    </p:tnLst>
+  </p:timing>
 </p:sld>
 </file>
 
@@ -15029,6 +15059,13 @@
   <p:clrMapOvr>
     <a:masterClrMapping/>
   </p:clrMapOvr>
+  <p:timing>
+    <p:tnLst>
+      <p:par>
+        <p:cTn id="1" dur="indefinite" restart="never" nodeType="tmRoot"/>
+      </p:par>
+    </p:tnLst>
+  </p:timing>
 </p:sld>
 </file>
 
@@ -22360,11 +22397,7 @@
           <a:p>
             <a:r>
               <a:rPr lang="en-US" sz="3200" dirty="0" smtClean="0"/>
-              <a:t>Test Suite: </a:t>
-            </a:r>
-            <a:r>
-              <a:rPr lang="en-US" sz="3200" dirty="0" smtClean="0"/>
-              <a:t>Development Approach</a:t>
+              <a:t>Test Suite: Development Approach</a:t>
             </a:r>
             <a:endParaRPr lang="en-US" sz="3200" dirty="0"/>
           </a:p>
@@ -22606,11 +22639,7 @@
             </a:pPr>
             <a:r>
               <a:rPr lang="en-US" sz="2000" dirty="0" smtClean="0"/>
-              <a:t>Check </a:t>
-            </a:r>
-            <a:r>
-              <a:rPr lang="en-US" sz="2000" dirty="0" smtClean="0"/>
-              <a:t>conformance of proof-of-concept implementation to the PSSM semantic model.</a:t>
+              <a:t>Check conformance of proof-of-concept implementation to the PSSM semantic model.</a:t>
             </a:r>
             <a:endParaRPr lang="en-US" sz="2000" dirty="0"/>
           </a:p>
@@ -29476,7 +29505,7 @@
             <p:ph idx="1"/>
             <p:extLst>
               <p:ext uri="{D42A27DB-BD31-4B8C-83A1-F6EECF244321}">
-                <p14:modId xmlns:p14="http://schemas.microsoft.com/office/powerpoint/2010/main" val="1229331010"/>
+                <p14:modId xmlns:p14="http://schemas.microsoft.com/office/powerpoint/2010/main" val="351291588"/>
               </p:ext>
             </p:extLst>
           </p:nvPr>
@@ -29920,7 +29949,31 @@
                             <a:schemeClr val="tx1"/>
                           </a:solidFill>
                         </a:rPr>
-                        <a:t> subsets UML 2.5 abstract syntax.</a:t>
+                        <a:t> subsets </a:t>
+                      </a:r>
+                      <a:r>
+                        <a:rPr lang="en-US" baseline="0" smtClean="0">
+                          <a:solidFill>
+                            <a:schemeClr val="tx1"/>
+                          </a:solidFill>
+                        </a:rPr>
+                        <a:t>UML </a:t>
+                      </a:r>
+                      <a:r>
+                        <a:rPr lang="en-US" baseline="0" smtClean="0">
+                          <a:solidFill>
+                            <a:schemeClr val="tx1"/>
+                          </a:solidFill>
+                        </a:rPr>
+                        <a:t>2.5.1 </a:t>
+                      </a:r>
+                      <a:r>
+                        <a:rPr lang="en-US" baseline="0" dirty="0" smtClean="0">
+                          <a:solidFill>
+                            <a:schemeClr val="tx1"/>
+                          </a:solidFill>
+                        </a:rPr>
+                        <a:t>abstract syntax.</a:t>
                       </a:r>
                       <a:endParaRPr lang="en-US" dirty="0">
                         <a:solidFill>
@@ -30429,11 +30482,27 @@
                             <a:schemeClr val="tx1"/>
                           </a:solidFill>
                         </a:rPr>
-                        <a:t>Proposal includes suite of 98 tests.</a:t>
+                        <a:t>Proposal includes suite of </a:t>
+                      </a:r>
+                      <a:r>
+                        <a:rPr lang="en-US" baseline="0" dirty="0" smtClean="0">
+                          <a:solidFill>
+                            <a:schemeClr val="tx1"/>
+                          </a:solidFill>
+                        </a:rPr>
+                        <a:t>103 </a:t>
+                      </a:r>
+                      <a:r>
+                        <a:rPr lang="en-US" baseline="0" dirty="0" smtClean="0">
+                          <a:solidFill>
+                            <a:schemeClr val="tx1"/>
+                          </a:solidFill>
+                        </a:rPr>
+                        <a:t>tests.</a:t>
                       </a:r>
                     </a:p>
                   </a:txBody>
-                  <a:tcPr>
+                  <a:tcPr marR="0">
                     <a:lnL w="12700" cap="flat" cmpd="sng" algn="ctr">
                       <a:solidFill>
                         <a:schemeClr val="tx1"/>
@@ -32722,12 +32791,12 @@
         <p:spPr>
           <a:xfrm>
             <a:off x="457200" y="1066800"/>
-            <a:ext cx="8229600" cy="5410200"/>
+            <a:ext cx="8229600" cy="5458544"/>
           </a:xfrm>
         </p:spPr>
         <p:txBody>
           <a:bodyPr>
-            <a:normAutofit fontScale="92500" lnSpcReduction="10000"/>
+            <a:normAutofit fontScale="85000" lnSpcReduction="10000"/>
           </a:bodyPr>
           <a:lstStyle/>
           <a:p>
@@ -32744,8 +32813,24 @@
             <a:pPr marL="914400" lvl="1" indent="-514350"/>
             <a:r>
               <a:rPr lang="en-US" dirty="0" smtClean="0"/>
-              <a:t>Not yet addressed.</a:t>
-            </a:r>
+              <a:t>PSSM semantics could be integrated into DOL via the </a:t>
+            </a:r>
+            <a:r>
+              <a:rPr lang="en-US" dirty="0" err="1" smtClean="0"/>
+              <a:t>bUML</a:t>
+            </a:r>
+            <a:r>
+              <a:rPr lang="en-US" dirty="0" smtClean="0"/>
+              <a:t> base semantics, but this would be quite complex.</a:t>
+            </a:r>
+          </a:p>
+          <a:p>
+            <a:pPr marL="914400" lvl="1" indent="-514350"/>
+            <a:r>
+              <a:rPr lang="en-US" dirty="0" smtClean="0"/>
+              <a:t>Could define logical semantics directly on some part of PSSM syntax, but submission team did not have resources to do so.</a:t>
+            </a:r>
+            <a:endParaRPr lang="en-US" dirty="0" smtClean="0"/>
           </a:p>
           <a:p>
             <a:pPr marL="514350" indent="-514350">

</xml_diff>